<commit_message>
Added all homeworks and notes.
</commit_message>
<xml_diff>
--- a/QualityAssurancePart1/Presentations/02.Fundamentals of Testing.pptx
+++ b/QualityAssurancePart1/Presentations/02.Fundamentals of Testing.pptx
@@ -243,7 +243,7 @@
             <a:fld id="{88EBD4C3-E5F3-4D5E-9E34-8C78933643D1}" type="datetimeFigureOut">
               <a:rPr lang="en-US" smtClean="0"/>
               <a:pPr/>
-              <a:t>11/9/2015</a:t>
+              <a:t>11/30/2015</a:t>
             </a:fld>
             <a:endParaRPr lang="en-US"/>
           </a:p>
@@ -14900,7 +14900,23 @@
             </a:pPr>
             <a:r>
               <a:rPr lang="en-US" sz="3000" dirty="0"/>
-              <a:t>Which of the following testing principles is most likely to help the test manager explain to these managers and executives why some defects are likely to be missed?</a:t>
+              <a:t>Which of the following testing principles is most likely to </a:t>
+            </a:r>
+            <a:r>
+              <a:rPr lang="en-US" sz="3000" dirty="0" smtClean="0"/>
+              <a:t>help the test manager explain to these managers and </a:t>
+            </a:r>
+            <a:r>
+              <a:rPr lang="en-US" sz="3000" dirty="0"/>
+              <a:t>executives why some defects are likely to </a:t>
+            </a:r>
+            <a:r>
+              <a:rPr lang="en-US" sz="3000" dirty="0" smtClean="0"/>
+              <a:t>be </a:t>
+            </a:r>
+            <a:r>
+              <a:rPr lang="en-US" sz="3000" dirty="0"/>
+              <a:t>missed?</a:t>
             </a:r>
           </a:p>
           <a:p>
@@ -14913,11 +14929,23 @@
               <a:buAutoNum type="alphaLcParenR"/>
             </a:pPr>
             <a:r>
-              <a:rPr lang="en-US" dirty="0" smtClean="0"/>
+              <a:rPr lang="en-US" dirty="0" smtClean="0">
+                <a:solidFill>
+                  <a:schemeClr val="tx1">
+                    <a:lumMod val="75000"/>
+                  </a:schemeClr>
+                </a:solidFill>
+              </a:rPr>
               <a:t>Exhaustive </a:t>
             </a:r>
             <a:r>
-              <a:rPr lang="en-US" dirty="0"/>
+              <a:rPr lang="en-US" dirty="0">
+                <a:solidFill>
+                  <a:schemeClr val="tx1">
+                    <a:lumMod val="75000"/>
+                  </a:schemeClr>
+                </a:solidFill>
+              </a:rPr>
               <a:t>testing is impossible</a:t>
             </a:r>
           </a:p>

</xml_diff>